<commit_message>
add residue in model
</commit_message>
<xml_diff>
--- a/talks/2021-03-24-Mike-Sot-mtg.pptx
+++ b/talks/2021-03-24-Mike-Sot-mtg.pptx
@@ -11,15 +11,16 @@
     <p:sldId id="256" r:id="rId5"/>
     <p:sldId id="273" r:id="rId6"/>
     <p:sldId id="274" r:id="rId7"/>
-    <p:sldId id="278" r:id="rId8"/>
-    <p:sldId id="266" r:id="rId9"/>
-    <p:sldId id="259" r:id="rId10"/>
-    <p:sldId id="261" r:id="rId11"/>
-    <p:sldId id="260" r:id="rId12"/>
-    <p:sldId id="264" r:id="rId13"/>
-    <p:sldId id="267" r:id="rId14"/>
-    <p:sldId id="257" r:id="rId15"/>
-    <p:sldId id="270" r:id="rId16"/>
+    <p:sldId id="279" r:id="rId8"/>
+    <p:sldId id="278" r:id="rId9"/>
+    <p:sldId id="266" r:id="rId10"/>
+    <p:sldId id="259" r:id="rId11"/>
+    <p:sldId id="261" r:id="rId12"/>
+    <p:sldId id="260" r:id="rId13"/>
+    <p:sldId id="264" r:id="rId14"/>
+    <p:sldId id="267" r:id="rId15"/>
+    <p:sldId id="257" r:id="rId16"/>
+    <p:sldId id="270" r:id="rId17"/>
   </p:sldIdLst>
   <p:sldSz cx="12192000" cy="6858000"/>
   <p:notesSz cx="6858000" cy="9144000"/>
@@ -3434,6 +3435,66 @@
       </p:grpSpPr>
       <p:pic>
         <p:nvPicPr>
+          <p:cNvPr id="12" name="Picture 11">
+            <a:extLst>
+              <a:ext uri="{FF2B5EF4-FFF2-40B4-BE49-F238E27FC236}">
+                <a16:creationId xmlns:a16="http://schemas.microsoft.com/office/drawing/2014/main" id="{0682B4F0-F1A1-4E07-A05C-B356FC344747}"/>
+              </a:ext>
+            </a:extLst>
+          </p:cNvPr>
+          <p:cNvPicPr>
+            <a:picLocks noChangeAspect="1"/>
+          </p:cNvPicPr>
+          <p:nvPr/>
+        </p:nvPicPr>
+        <p:blipFill>
+          <a:blip r:embed="rId2"/>
+          <a:stretch>
+            <a:fillRect/>
+          </a:stretch>
+        </p:blipFill>
+        <p:spPr>
+          <a:xfrm>
+            <a:off x="886047" y="121386"/>
+            <a:ext cx="10419905" cy="6615228"/>
+          </a:xfrm>
+          <a:prstGeom prst="rect">
+            <a:avLst/>
+          </a:prstGeom>
+        </p:spPr>
+      </p:pic>
+    </p:spTree>
+    <p:extLst>
+      <p:ext uri="{BB962C8B-B14F-4D97-AF65-F5344CB8AC3E}">
+        <p14:creationId xmlns:p14="http://schemas.microsoft.com/office/powerpoint/2010/main" val="3884832672"/>
+      </p:ext>
+    </p:extLst>
+  </p:cSld>
+  <p:clrMapOvr>
+    <a:masterClrMapping/>
+  </p:clrMapOvr>
+</p:sld>
+</file>
+
+<file path=ppt/slides/slide11.xml><?xml version="1.0" encoding="utf-8"?>
+<p:sld xmlns:a="http://schemas.openxmlformats.org/drawingml/2006/main" xmlns:r="http://schemas.openxmlformats.org/officeDocument/2006/relationships" xmlns:p="http://schemas.openxmlformats.org/presentationml/2006/main">
+  <p:cSld>
+    <p:spTree>
+      <p:nvGrpSpPr>
+        <p:cNvPr id="1" name=""/>
+        <p:cNvGrpSpPr/>
+        <p:nvPr/>
+      </p:nvGrpSpPr>
+      <p:grpSpPr>
+        <a:xfrm>
+          <a:off x="0" y="0"/>
+          <a:ext cx="0" cy="0"/>
+          <a:chOff x="0" y="0"/>
+          <a:chExt cx="0" cy="0"/>
+        </a:xfrm>
+      </p:grpSpPr>
+      <p:pic>
+        <p:nvPicPr>
           <p:cNvPr id="10" name="Picture 9">
             <a:extLst>
               <a:ext uri="{FF2B5EF4-FFF2-40B4-BE49-F238E27FC236}">
@@ -3679,7 +3740,7 @@
 </p:sld>
 </file>
 
-<file path=ppt/slides/slide11.xml><?xml version="1.0" encoding="utf-8"?>
+<file path=ppt/slides/slide12.xml><?xml version="1.0" encoding="utf-8"?>
 <p:sld xmlns:a="http://schemas.openxmlformats.org/drawingml/2006/main" xmlns:r="http://schemas.openxmlformats.org/officeDocument/2006/relationships" xmlns:p="http://schemas.openxmlformats.org/presentationml/2006/main">
   <p:cSld>
     <p:spTree>
@@ -4111,7 +4172,7 @@
 </p:sld>
 </file>
 
-<file path=ppt/slides/slide12.xml><?xml version="1.0" encoding="utf-8"?>
+<file path=ppt/slides/slide13.xml><?xml version="1.0" encoding="utf-8"?>
 <p:sld xmlns:a="http://schemas.openxmlformats.org/drawingml/2006/main" xmlns:r="http://schemas.openxmlformats.org/officeDocument/2006/relationships" xmlns:p="http://schemas.openxmlformats.org/presentationml/2006/main">
   <p:cSld>
     <p:spTree>
@@ -4457,7 +4518,7 @@
 </p:sld>
 </file>
 
-<file path=ppt/slides/slide13.xml><?xml version="1.0" encoding="utf-8"?>
+<file path=ppt/slides/slide14.xml><?xml version="1.0" encoding="utf-8"?>
 <p:sld xmlns:a="http://schemas.openxmlformats.org/drawingml/2006/main" xmlns:r="http://schemas.openxmlformats.org/officeDocument/2006/relationships" xmlns:p="http://schemas.openxmlformats.org/presentationml/2006/main">
   <p:cSld>
     <p:spTree>
@@ -4517,8 +4578,24 @@
         </p:nvSpPr>
         <p:spPr/>
         <p:txBody>
-          <a:bodyPr/>
-          <a:lstStyle/>
+          <a:bodyPr>
+            <a:normAutofit lnSpcReduction="10000"/>
+          </a:bodyPr>
+          <a:lstStyle/>
+          <a:p>
+            <a:r>
+              <a:rPr lang="en-US" dirty="0"/>
+              <a:t>At normal nitrogen rates, yield of rotated corn is not a good predictor of penalty. It’s how badly the continuous corn FAILS to achieve it’s </a:t>
+            </a:r>
+            <a:r>
+              <a:rPr lang="en-US"/>
+              <a:t>yield potential. </a:t>
+            </a:r>
+            <a:endParaRPr lang="en-US" dirty="0"/>
+          </a:p>
+          <a:p>
+            <a:endParaRPr lang="en-US" dirty="0"/>
+          </a:p>
           <a:p>
             <a:r>
               <a:rPr lang="en-US" dirty="0"/>
@@ -4579,7 +4656,7 @@
 </p:sld>
 </file>
 
-<file path=ppt/slides/slide14.xml><?xml version="1.0" encoding="utf-8"?>
+<file path=ppt/slides/slide15.xml><?xml version="1.0" encoding="utf-8"?>
 <p:sld xmlns:a="http://schemas.openxmlformats.org/drawingml/2006/main" xmlns:r="http://schemas.openxmlformats.org/officeDocument/2006/relationships" xmlns:p="http://schemas.openxmlformats.org/presentationml/2006/main">
   <p:cSld>
     <p:spTree>
@@ -5405,7 +5482,7 @@
 </p:sld>
 </file>
 
-<file path=ppt/slides/slide15.xml><?xml version="1.0" encoding="utf-8"?>
+<file path=ppt/slides/slide16.xml><?xml version="1.0" encoding="utf-8"?>
 <p:sld xmlns:a="http://schemas.openxmlformats.org/drawingml/2006/main" xmlns:r="http://schemas.openxmlformats.org/officeDocument/2006/relationships" xmlns:p="http://schemas.openxmlformats.org/presentationml/2006/main">
   <p:cSld>
     <p:spTree>
@@ -6057,6 +6134,14 @@
               <a:rPr lang="en-US" dirty="0" err="1"/>
               <a:t>pctNgap</a:t>
             </a:r>
+            <a:r>
+              <a:rPr lang="en-US" dirty="0"/>
+              <a:t> – </a:t>
+            </a:r>
+            <a:r>
+              <a:rPr lang="en-US"/>
+              <a:t>‘Heritability’</a:t>
+            </a:r>
             <a:endParaRPr lang="en-US" dirty="0"/>
           </a:p>
         </p:txBody>
@@ -6088,10 +6173,10 @@
       </p:sp>
       <p:pic>
         <p:nvPicPr>
-          <p:cNvPr id="7" name="Picture 6">
-            <a:extLst>
-              <a:ext uri="{FF2B5EF4-FFF2-40B4-BE49-F238E27FC236}">
-                <a16:creationId xmlns:a16="http://schemas.microsoft.com/office/drawing/2014/main" id="{8E466DAC-EECA-49DA-9317-213735BC5DBF}"/>
+          <p:cNvPr id="6" name="Picture 5">
+            <a:extLst>
+              <a:ext uri="{FF2B5EF4-FFF2-40B4-BE49-F238E27FC236}">
+                <a16:creationId xmlns:a16="http://schemas.microsoft.com/office/drawing/2014/main" id="{481FA5A0-3AC3-4426-83BD-67FC7BA39D05}"/>
               </a:ext>
             </a:extLst>
           </p:cNvPr>
@@ -6108,6 +6193,36 @@
         </p:blipFill>
         <p:spPr>
           <a:xfrm>
+            <a:off x="6541801" y="4599544"/>
+            <a:ext cx="2085975" cy="1495425"/>
+          </a:xfrm>
+          <a:prstGeom prst="rect">
+            <a:avLst/>
+          </a:prstGeom>
+        </p:spPr>
+      </p:pic>
+      <p:pic>
+        <p:nvPicPr>
+          <p:cNvPr id="7" name="Picture 6">
+            <a:extLst>
+              <a:ext uri="{FF2B5EF4-FFF2-40B4-BE49-F238E27FC236}">
+                <a16:creationId xmlns:a16="http://schemas.microsoft.com/office/drawing/2014/main" id="{8E466DAC-EECA-49DA-9317-213735BC5DBF}"/>
+              </a:ext>
+            </a:extLst>
+          </p:cNvPr>
+          <p:cNvPicPr>
+            <a:picLocks noChangeAspect="1"/>
+          </p:cNvPicPr>
+          <p:nvPr/>
+        </p:nvPicPr>
+        <p:blipFill>
+          <a:blip r:embed="rId3"/>
+          <a:stretch>
+            <a:fillRect/>
+          </a:stretch>
+        </p:blipFill>
+        <p:spPr>
+          <a:xfrm>
             <a:off x="-766762" y="1800629"/>
             <a:ext cx="6668516" cy="4650077"/>
           </a:xfrm>
@@ -6125,15 +6240,13 @@
               </a:ext>
             </a:extLst>
           </p:cNvPr>
-          <p:cNvCxnSpPr>
-            <a:cxnSpLocks/>
-          </p:cNvCxnSpPr>
+          <p:cNvCxnSpPr/>
           <p:nvPr/>
         </p:nvCxnSpPr>
         <p:spPr>
           <a:xfrm flipV="1">
-            <a:off x="3185302" y="3071674"/>
-            <a:ext cx="1874970" cy="230821"/>
+            <a:off x="2918972" y="5122415"/>
+            <a:ext cx="3542191" cy="79899"/>
           </a:xfrm>
           <a:prstGeom prst="straightConnector1">
             <a:avLst/>
@@ -6162,10 +6275,10 @@
       </p:cxnSp>
       <p:pic>
         <p:nvPicPr>
-          <p:cNvPr id="11" name="Picture 10">
-            <a:extLst>
-              <a:ext uri="{FF2B5EF4-FFF2-40B4-BE49-F238E27FC236}">
-                <a16:creationId xmlns:a16="http://schemas.microsoft.com/office/drawing/2014/main" id="{75691CD1-2EDF-42A0-86EA-18E3E885C8E8}"/>
+          <p:cNvPr id="5" name="Picture 4">
+            <a:extLst>
+              <a:ext uri="{FF2B5EF4-FFF2-40B4-BE49-F238E27FC236}">
+                <a16:creationId xmlns:a16="http://schemas.microsoft.com/office/drawing/2014/main" id="{48E08F31-B650-44B7-B0EC-E7F590D9529F}"/>
               </a:ext>
             </a:extLst>
           </p:cNvPr>
@@ -6175,25 +6288,77 @@
           <p:nvPr/>
         </p:nvPicPr>
         <p:blipFill>
-          <a:blip r:embed="rId3"/>
+          <a:blip r:embed="rId4"/>
           <a:stretch>
             <a:fillRect/>
           </a:stretch>
         </p:blipFill>
         <p:spPr>
           <a:xfrm>
-            <a:off x="5265367" y="1475066"/>
-            <a:ext cx="5966977" cy="4160881"/>
+            <a:off x="4833337" y="1784794"/>
+            <a:ext cx="6402277" cy="2332711"/>
           </a:xfrm>
           <a:prstGeom prst="rect">
             <a:avLst/>
           </a:prstGeom>
         </p:spPr>
       </p:pic>
+      <p:sp>
+        <p:nvSpPr>
+          <p:cNvPr id="8" name="Rectangle 7">
+            <a:extLst>
+              <a:ext uri="{FF2B5EF4-FFF2-40B4-BE49-F238E27FC236}">
+                <a16:creationId xmlns:a16="http://schemas.microsoft.com/office/drawing/2014/main" id="{C2AC54BA-AEA9-45AC-A8E5-DC231FE326B4}"/>
+              </a:ext>
+            </a:extLst>
+          </p:cNvPr>
+          <p:cNvSpPr/>
+          <p:nvPr/>
+        </p:nvSpPr>
+        <p:spPr>
+          <a:xfrm>
+            <a:off x="4690067" y="3490135"/>
+            <a:ext cx="6730408" cy="244029"/>
+          </a:xfrm>
+          <a:prstGeom prst="rect">
+            <a:avLst/>
+          </a:prstGeom>
+          <a:noFill/>
+          <a:ln w="38100">
+            <a:solidFill>
+              <a:schemeClr val="accent1"/>
+            </a:solidFill>
+          </a:ln>
+        </p:spPr>
+        <p:style>
+          <a:lnRef idx="2">
+            <a:schemeClr val="accent1">
+              <a:shade val="50000"/>
+            </a:schemeClr>
+          </a:lnRef>
+          <a:fillRef idx="1">
+            <a:schemeClr val="accent1"/>
+          </a:fillRef>
+          <a:effectRef idx="0">
+            <a:schemeClr val="accent1"/>
+          </a:effectRef>
+          <a:fontRef idx="minor">
+            <a:schemeClr val="lt1"/>
+          </a:fontRef>
+        </p:style>
+        <p:txBody>
+          <a:bodyPr rtlCol="0" anchor="ctr"/>
+          <a:lstStyle/>
+          <a:p>
+            <a:pPr algn="ctr"/>
+            <a:endParaRPr lang="en-US"/>
+          </a:p>
+        </p:txBody>
+      </p:sp>
     </p:spTree>
     <p:extLst>
       <p:ext uri="{BB962C8B-B14F-4D97-AF65-F5344CB8AC3E}">
-        <p14:creationId xmlns:p14="http://schemas.microsoft.com/office/powerpoint/2010/main" val="3284366339"/>
+        <p14:creationId xmlns:p14="http://schemas.microsoft.com/office/powerpoint/2010/main" val="3660208882"/>
       </p:ext>
     </p:extLst>
   </p:cSld>
@@ -6225,7 +6390,7 @@
           <p:cNvPr id="2" name="Title 1">
             <a:extLst>
               <a:ext uri="{FF2B5EF4-FFF2-40B4-BE49-F238E27FC236}">
-                <a16:creationId xmlns:a16="http://schemas.microsoft.com/office/drawing/2014/main" id="{D6210366-ECF7-4DAB-83DA-28A0203FDD4A}"/>
+                <a16:creationId xmlns:a16="http://schemas.microsoft.com/office/drawing/2014/main" id="{A1B05E9C-99D7-4D91-9FBE-61010F8B3125}"/>
               </a:ext>
             </a:extLst>
           </p:cNvPr>
@@ -6243,15 +6408,149 @@
           <a:p>
             <a:r>
               <a:rPr lang="en-US" dirty="0"/>
-              <a:t>Is N-contribution related to size of gap?</a:t>
-            </a:r>
-          </a:p>
-        </p:txBody>
-      </p:sp>
+              <a:t>Variation in </a:t>
+            </a:r>
+            <a:r>
+              <a:rPr lang="en-US" dirty="0" err="1"/>
+              <a:t>pctNgap</a:t>
+            </a:r>
+            <a:endParaRPr lang="en-US" dirty="0"/>
+          </a:p>
+        </p:txBody>
+      </p:sp>
+      <p:sp>
+        <p:nvSpPr>
+          <p:cNvPr id="3" name="Content Placeholder 2">
+            <a:extLst>
+              <a:ext uri="{FF2B5EF4-FFF2-40B4-BE49-F238E27FC236}">
+                <a16:creationId xmlns:a16="http://schemas.microsoft.com/office/drawing/2014/main" id="{0C11D66B-2C3A-4A6A-A386-42A1825DFE8A}"/>
+              </a:ext>
+            </a:extLst>
+          </p:cNvPr>
+          <p:cNvSpPr>
+            <a:spLocks noGrp="1"/>
+          </p:cNvSpPr>
+          <p:nvPr>
+            <p:ph idx="1"/>
+          </p:nvPr>
+        </p:nvSpPr>
+        <p:spPr/>
+        <p:txBody>
+          <a:bodyPr/>
+          <a:lstStyle/>
+          <a:p>
+            <a:endParaRPr lang="en-US" dirty="0"/>
+          </a:p>
+        </p:txBody>
+      </p:sp>
+      <p:pic>
+        <p:nvPicPr>
+          <p:cNvPr id="7" name="Picture 6">
+            <a:extLst>
+              <a:ext uri="{FF2B5EF4-FFF2-40B4-BE49-F238E27FC236}">
+                <a16:creationId xmlns:a16="http://schemas.microsoft.com/office/drawing/2014/main" id="{8E466DAC-EECA-49DA-9317-213735BC5DBF}"/>
+              </a:ext>
+            </a:extLst>
+          </p:cNvPr>
+          <p:cNvPicPr>
+            <a:picLocks noChangeAspect="1"/>
+          </p:cNvPicPr>
+          <p:nvPr/>
+        </p:nvPicPr>
+        <p:blipFill>
+          <a:blip r:embed="rId2"/>
+          <a:stretch>
+            <a:fillRect/>
+          </a:stretch>
+        </p:blipFill>
+        <p:spPr>
+          <a:xfrm>
+            <a:off x="-766762" y="1800629"/>
+            <a:ext cx="6668516" cy="4650077"/>
+          </a:xfrm>
+          <a:prstGeom prst="rect">
+            <a:avLst/>
+          </a:prstGeom>
+        </p:spPr>
+      </p:pic>
+      <p:cxnSp>
+        <p:nvCxnSpPr>
+          <p:cNvPr id="9" name="Straight Arrow Connector 8">
+            <a:extLst>
+              <a:ext uri="{FF2B5EF4-FFF2-40B4-BE49-F238E27FC236}">
+                <a16:creationId xmlns:a16="http://schemas.microsoft.com/office/drawing/2014/main" id="{CDD6859A-2955-43F9-8732-266B727F264A}"/>
+              </a:ext>
+            </a:extLst>
+          </p:cNvPr>
+          <p:cNvCxnSpPr>
+            <a:cxnSpLocks/>
+          </p:cNvCxnSpPr>
+          <p:nvPr/>
+        </p:nvCxnSpPr>
+        <p:spPr>
+          <a:xfrm flipV="1">
+            <a:off x="3185302" y="3071674"/>
+            <a:ext cx="1874970" cy="230821"/>
+          </a:xfrm>
+          <a:prstGeom prst="straightConnector1">
+            <a:avLst/>
+          </a:prstGeom>
+          <a:ln w="76200">
+            <a:solidFill>
+              <a:schemeClr val="tx1"/>
+            </a:solidFill>
+            <a:tailEnd type="triangle"/>
+          </a:ln>
+        </p:spPr>
+        <p:style>
+          <a:lnRef idx="1">
+            <a:schemeClr val="accent1"/>
+          </a:lnRef>
+          <a:fillRef idx="0">
+            <a:schemeClr val="accent1"/>
+          </a:fillRef>
+          <a:effectRef idx="0">
+            <a:schemeClr val="accent1"/>
+          </a:effectRef>
+          <a:fontRef idx="minor">
+            <a:schemeClr val="tx1"/>
+          </a:fontRef>
+        </p:style>
+      </p:cxnSp>
+      <p:pic>
+        <p:nvPicPr>
+          <p:cNvPr id="11" name="Picture 10">
+            <a:extLst>
+              <a:ext uri="{FF2B5EF4-FFF2-40B4-BE49-F238E27FC236}">
+                <a16:creationId xmlns:a16="http://schemas.microsoft.com/office/drawing/2014/main" id="{75691CD1-2EDF-42A0-86EA-18E3E885C8E8}"/>
+              </a:ext>
+            </a:extLst>
+          </p:cNvPr>
+          <p:cNvPicPr>
+            <a:picLocks noChangeAspect="1"/>
+          </p:cNvPicPr>
+          <p:nvPr/>
+        </p:nvPicPr>
+        <p:blipFill>
+          <a:blip r:embed="rId3"/>
+          <a:stretch>
+            <a:fillRect/>
+          </a:stretch>
+        </p:blipFill>
+        <p:spPr>
+          <a:xfrm>
+            <a:off x="5265367" y="1475066"/>
+            <a:ext cx="5966977" cy="4160881"/>
+          </a:xfrm>
+          <a:prstGeom prst="rect">
+            <a:avLst/>
+          </a:prstGeom>
+        </p:spPr>
+      </p:pic>
     </p:spTree>
     <p:extLst>
       <p:ext uri="{BB962C8B-B14F-4D97-AF65-F5344CB8AC3E}">
-        <p14:creationId xmlns:p14="http://schemas.microsoft.com/office/powerpoint/2010/main" val="1021224791"/>
+        <p14:creationId xmlns:p14="http://schemas.microsoft.com/office/powerpoint/2010/main" val="3284366339"/>
       </p:ext>
     </p:extLst>
   </p:cSld>
@@ -6278,40 +6577,38 @@
           <a:chExt cx="0" cy="0"/>
         </a:xfrm>
       </p:grpSpPr>
-      <p:pic>
-        <p:nvPicPr>
-          <p:cNvPr id="12" name="Picture 11">
-            <a:extLst>
-              <a:ext uri="{FF2B5EF4-FFF2-40B4-BE49-F238E27FC236}">
-                <a16:creationId xmlns:a16="http://schemas.microsoft.com/office/drawing/2014/main" id="{0682B4F0-F1A1-4E07-A05C-B356FC344747}"/>
-              </a:ext>
-            </a:extLst>
-          </p:cNvPr>
-          <p:cNvPicPr>
-            <a:picLocks noChangeAspect="1"/>
-          </p:cNvPicPr>
-          <p:nvPr/>
-        </p:nvPicPr>
-        <p:blipFill>
-          <a:blip r:embed="rId2"/>
-          <a:stretch>
-            <a:fillRect/>
-          </a:stretch>
-        </p:blipFill>
-        <p:spPr>
-          <a:xfrm>
-            <a:off x="886047" y="121386"/>
-            <a:ext cx="10419905" cy="6615228"/>
-          </a:xfrm>
-          <a:prstGeom prst="rect">
-            <a:avLst/>
-          </a:prstGeom>
-        </p:spPr>
-      </p:pic>
+      <p:sp>
+        <p:nvSpPr>
+          <p:cNvPr id="2" name="Title 1">
+            <a:extLst>
+              <a:ext uri="{FF2B5EF4-FFF2-40B4-BE49-F238E27FC236}">
+                <a16:creationId xmlns:a16="http://schemas.microsoft.com/office/drawing/2014/main" id="{D6210366-ECF7-4DAB-83DA-28A0203FDD4A}"/>
+              </a:ext>
+            </a:extLst>
+          </p:cNvPr>
+          <p:cNvSpPr>
+            <a:spLocks noGrp="1"/>
+          </p:cNvSpPr>
+          <p:nvPr>
+            <p:ph type="title"/>
+          </p:nvPr>
+        </p:nvSpPr>
+        <p:spPr/>
+        <p:txBody>
+          <a:bodyPr/>
+          <a:lstStyle/>
+          <a:p>
+            <a:r>
+              <a:rPr lang="en-US" dirty="0"/>
+              <a:t>Is N-contribution related to size of gap?</a:t>
+            </a:r>
+          </a:p>
+        </p:txBody>
+      </p:sp>
     </p:spTree>
     <p:extLst>
       <p:ext uri="{BB962C8B-B14F-4D97-AF65-F5344CB8AC3E}">
-        <p14:creationId xmlns:p14="http://schemas.microsoft.com/office/powerpoint/2010/main" val="3884832672"/>
+        <p14:creationId xmlns:p14="http://schemas.microsoft.com/office/powerpoint/2010/main" val="1021224791"/>
       </p:ext>
     </p:extLst>
   </p:cSld>

</xml_diff>